<commit_message>
Update Analysis and Reccomendation Presentation.pptx
Updates to ppt
</commit_message>
<xml_diff>
--- a/Analysis and Reccomendation Presentation.pptx
+++ b/Analysis and Reccomendation Presentation.pptx
@@ -4899,19 +4899,19 @@
     <dgm:cxn modelId="{64050F34-335F-43CE-8BAE-81F674686DB5}" type="presOf" srcId="{DF20775B-1D29-4092-B301-6965981B3548}" destId="{15914202-C424-4671-A803-02B0B6D43882}" srcOrd="0" destOrd="0" presId="urn:microsoft.com/office/officeart/2005/8/layout/hList1"/>
     <dgm:cxn modelId="{4AFD4C35-5D7E-F247-A61C-A37B52DE72E8}" type="presOf" srcId="{D6700288-1BEA-CF41-A90E-FB9891041561}" destId="{15914202-C424-4671-A803-02B0B6D43882}" srcOrd="0" destOrd="3" presId="urn:microsoft.com/office/officeart/2005/8/layout/hList1"/>
     <dgm:cxn modelId="{3F183939-006B-4396-9B0E-58F28ED33C56}" srcId="{BE919AD8-CB0A-47CE-A012-622F109A0A49}" destId="{DC528F0B-D96A-4A76-BF95-D907B1FB7B4F}" srcOrd="0" destOrd="0" parTransId="{C9E2C901-798A-4B7E-9DB5-A720395AE412}" sibTransId="{0E682562-B187-4BFC-B2D4-26F4BE3D771F}"/>
+    <dgm:cxn modelId="{59931C60-357E-EF4B-94AC-EC719AF9CAAD}" srcId="{BE919AD8-CB0A-47CE-A012-622F109A0A49}" destId="{B9F60A67-560B-3345-A605-D614F1F04AED}" srcOrd="6" destOrd="0" parTransId="{6055FBDB-2A97-D947-922C-4FC8B12BB60E}" sibTransId="{F86B2150-9913-264F-9FEF-A80BB8C36C22}"/>
+    <dgm:cxn modelId="{F807F260-498F-4105-90B0-FF99CC9D562B}" type="presOf" srcId="{1A16556A-4A0A-4AC0-BA55-2A58E15F93A9}" destId="{391892B7-30B7-4F7A-8F61-247BD1784957}" srcOrd="0" destOrd="2" presId="urn:microsoft.com/office/officeart/2005/8/layout/hList1"/>
     <dgm:cxn modelId="{FC5F6942-79C4-4ED6-99EC-63496C3BF449}" srcId="{CEF49EBA-9A3F-4E9E-ACA3-E45765A831AE}" destId="{CAA2CC30-B501-4D89-BE35-4A990EF49618}" srcOrd="2" destOrd="0" parTransId="{FDEA792B-B72E-477C-B138-86AE57EB37FA}" sibTransId="{D26C0C0E-D5EA-4C7B-88DB-923CF73AF112}"/>
     <dgm:cxn modelId="{6D478C42-7F61-6C41-9CE6-EACFC0C1C002}" type="presOf" srcId="{7476709B-56F4-484A-B3EF-5B1826DF43F3}" destId="{4B187744-4B45-4628-80A2-452EC69E8428}" srcOrd="0" destOrd="1" presId="urn:microsoft.com/office/officeart/2005/8/layout/hList1"/>
+    <dgm:cxn modelId="{B9104964-5FF0-4246-BE19-C00DCFFA74B5}" srcId="{2E7A2E44-11DB-42B1-BFDD-604DFF03E3E3}" destId="{DF20775B-1D29-4092-B301-6965981B3548}" srcOrd="0" destOrd="0" parTransId="{C55CC494-E750-4B8A-A5BC-8D2ABD8D457E}" sibTransId="{299EC0E2-B304-435B-A091-2CE91F4CB87F}"/>
     <dgm:cxn modelId="{886E2348-938B-9341-AF98-295CE865F898}" type="presOf" srcId="{B9F60A67-560B-3345-A605-D614F1F04AED}" destId="{391892B7-30B7-4F7A-8F61-247BD1784957}" srcOrd="0" destOrd="7" presId="urn:microsoft.com/office/officeart/2005/8/layout/hList1"/>
     <dgm:cxn modelId="{62C25749-AE53-464C-AA37-53B7AC58E13C}" type="presOf" srcId="{207EFB82-2B72-1D49-9162-F94E1A08C839}" destId="{391892B7-30B7-4F7A-8F61-247BD1784957}" srcOrd="0" destOrd="1" presId="urn:microsoft.com/office/officeart/2005/8/layout/hList1"/>
     <dgm:cxn modelId="{FF56FF4A-8A8F-4E40-8566-C02EA88D44BD}" srcId="{2E7A2E44-11DB-42B1-BFDD-604DFF03E3E3}" destId="{D6700288-1BEA-CF41-A90E-FB9891041561}" srcOrd="3" destOrd="0" parTransId="{1B5E6777-B63C-B04C-AA01-1B2C1CAFC43C}" sibTransId="{B6715ACE-6BAD-314D-8CD8-D34DE86508B7}"/>
     <dgm:cxn modelId="{DB4B304E-5D08-804B-A7FB-235AFCAC6907}" srcId="{CAA2CC30-B501-4D89-BE35-4A990EF49618}" destId="{195A1D4E-B9B9-334C-BAFE-D0120A98E333}" srcOrd="4" destOrd="0" parTransId="{4E813964-81EB-FB44-BFD2-0A1C8267B75E}" sibTransId="{DC22E5C6-43AE-1641-BCBD-130FAE14F3FA}"/>
     <dgm:cxn modelId="{EAB2BE4F-7BAD-824D-A96C-525388CDE741}" srcId="{BE919AD8-CB0A-47CE-A012-622F109A0A49}" destId="{F3C892FD-EE31-6F44-ACC6-1FFE2DBF49D6}" srcOrd="7" destOrd="0" parTransId="{E9D7BBBF-B15F-C94D-B28A-F6DD62F38BEF}" sibTransId="{1AE830DC-67EA-3345-BE23-135AF03ACA50}"/>
-    <dgm:cxn modelId="{F5131A57-E1B1-9644-9B9D-73E7620509DD}" srcId="{CAA2CC30-B501-4D89-BE35-4A990EF49618}" destId="{3E5C3CC5-7CB6-0744-BB9D-0DD5D8A8AE54}" srcOrd="3" destOrd="0" parTransId="{411DD8DA-E736-444D-9264-29D3932B3B19}" sibTransId="{D0055058-92C5-384A-AD1F-3B08E436DBB1}"/>
-    <dgm:cxn modelId="{59931C60-357E-EF4B-94AC-EC719AF9CAAD}" srcId="{BE919AD8-CB0A-47CE-A012-622F109A0A49}" destId="{B9F60A67-560B-3345-A605-D614F1F04AED}" srcOrd="6" destOrd="0" parTransId="{6055FBDB-2A97-D947-922C-4FC8B12BB60E}" sibTransId="{F86B2150-9913-264F-9FEF-A80BB8C36C22}"/>
-    <dgm:cxn modelId="{F807F260-498F-4105-90B0-FF99CC9D562B}" type="presOf" srcId="{1A16556A-4A0A-4AC0-BA55-2A58E15F93A9}" destId="{391892B7-30B7-4F7A-8F61-247BD1784957}" srcOrd="0" destOrd="2" presId="urn:microsoft.com/office/officeart/2005/8/layout/hList1"/>
-    <dgm:cxn modelId="{B9104964-5FF0-4246-BE19-C00DCFFA74B5}" srcId="{2E7A2E44-11DB-42B1-BFDD-604DFF03E3E3}" destId="{DF20775B-1D29-4092-B301-6965981B3548}" srcOrd="0" destOrd="0" parTransId="{C55CC494-E750-4B8A-A5BC-8D2ABD8D457E}" sibTransId="{299EC0E2-B304-435B-A091-2CE91F4CB87F}"/>
     <dgm:cxn modelId="{EEF4DD70-B982-5F4F-AB2B-12878A3D0B42}" type="presOf" srcId="{A2749A43-4D31-6844-B331-FFD241392134}" destId="{15914202-C424-4671-A803-02B0B6D43882}" srcOrd="0" destOrd="6" presId="urn:microsoft.com/office/officeart/2005/8/layout/hList1"/>
     <dgm:cxn modelId="{EC0D7071-82BA-4B1D-9678-BA82C3C5A82B}" type="presOf" srcId="{EDD9A4AA-9E74-4ADB-B134-94DFA6C61FF9}" destId="{391892B7-30B7-4F7A-8F61-247BD1784957}" srcOrd="0" destOrd="5" presId="urn:microsoft.com/office/officeart/2005/8/layout/hList1"/>
+    <dgm:cxn modelId="{F5131A57-E1B1-9644-9B9D-73E7620509DD}" srcId="{CAA2CC30-B501-4D89-BE35-4A990EF49618}" destId="{3E5C3CC5-7CB6-0744-BB9D-0DD5D8A8AE54}" srcOrd="3" destOrd="0" parTransId="{411DD8DA-E736-444D-9264-29D3932B3B19}" sibTransId="{D0055058-92C5-384A-AD1F-3B08E436DBB1}"/>
     <dgm:cxn modelId="{A5D28C82-D2F6-0046-8E27-4947C7C94DC9}" type="presOf" srcId="{A35C442B-76B4-3E40-91BB-185B765BDB38}" destId="{4B187744-4B45-4628-80A2-452EC69E8428}" srcOrd="0" destOrd="2" presId="urn:microsoft.com/office/officeart/2005/8/layout/hList1"/>
     <dgm:cxn modelId="{95FB8989-A5C8-4E9C-8569-A4B631C1A280}" type="presOf" srcId="{75FEF0AE-B79A-4620-9A49-CAFC3A18A1CD}" destId="{15914202-C424-4671-A803-02B0B6D43882}" srcOrd="0" destOrd="1" presId="urn:microsoft.com/office/officeart/2005/8/layout/hList1"/>
     <dgm:cxn modelId="{35A8058C-3465-C249-BDE5-718591E76510}" srcId="{2E7A2E44-11DB-42B1-BFDD-604DFF03E3E3}" destId="{952284E9-7676-6F4E-9F9A-7408EC30AC15}" srcOrd="5" destOrd="0" parTransId="{1DF62C5C-57AC-EC4D-B0A3-F87E34D1CB40}" sibTransId="{2441A576-04DD-9A42-8E96-A590A040C25A}"/>
@@ -10791,7 +10791,7 @@
           <a:p>
             <a:fld id="{061C5132-FFA3-4B02-9F09-22FCF40EFA74}" type="datetimeFigureOut">
               <a:rPr lang="en-US" smtClean="0"/>
-              <a:t>3/12/21</a:t>
+              <a:t>3/12/2021</a:t>
             </a:fld>
             <a:endParaRPr lang="en-US"/>
           </a:p>
@@ -10956,7 +10956,7 @@
           <a:p>
             <a:fld id="{0B6E42C9-243F-4DC5-AFF6-9D56B5FA9D63}" type="datetimeFigureOut">
               <a:rPr lang="en-US" smtClean="0"/>
-              <a:t>3/12/21</a:t>
+              <a:t>3/12/2021</a:t>
             </a:fld>
             <a:endParaRPr lang="en-US"/>
           </a:p>
@@ -11704,7 +11704,7 @@
           <a:p>
             <a:fld id="{B0FE2824-C2A0-4931-BB32-60B24BDBB3CC}" type="datetimeFigureOut">
               <a:rPr lang="en-US" smtClean="0"/>
-              <a:t>3/12/21</a:t>
+              <a:t>3/12/2021</a:t>
             </a:fld>
             <a:endParaRPr lang="en-US"/>
           </a:p>
@@ -11899,7 +11899,7 @@
           <a:p>
             <a:fld id="{B0FE2824-C2A0-4931-BB32-60B24BDBB3CC}" type="datetimeFigureOut">
               <a:rPr lang="en-US" smtClean="0"/>
-              <a:t>3/12/21</a:t>
+              <a:t>3/12/2021</a:t>
             </a:fld>
             <a:endParaRPr lang="en-US"/>
           </a:p>
@@ -12079,7 +12079,7 @@
           <a:p>
             <a:fld id="{B0FE2824-C2A0-4931-BB32-60B24BDBB3CC}" type="datetimeFigureOut">
               <a:rPr lang="en-US" smtClean="0"/>
-              <a:t>3/12/21</a:t>
+              <a:t>3/12/2021</a:t>
             </a:fld>
             <a:endParaRPr lang="en-US"/>
           </a:p>
@@ -12599,7 +12599,7 @@
           <a:p>
             <a:fld id="{B0FE2824-C2A0-4931-BB32-60B24BDBB3CC}" type="datetimeFigureOut">
               <a:rPr lang="en-US" smtClean="0"/>
-              <a:t>3/12/21</a:t>
+              <a:t>3/12/2021</a:t>
             </a:fld>
             <a:endParaRPr lang="en-US"/>
           </a:p>
@@ -13041,7 +13041,7 @@
           <a:p>
             <a:fld id="{B0FE2824-C2A0-4931-BB32-60B24BDBB3CC}" type="datetimeFigureOut">
               <a:rPr lang="en-US" smtClean="0"/>
-              <a:t>3/12/21</a:t>
+              <a:t>3/12/2021</a:t>
             </a:fld>
             <a:endParaRPr lang="en-US"/>
           </a:p>
@@ -13170,7 +13170,7 @@
           <a:p>
             <a:fld id="{B0FE2824-C2A0-4931-BB32-60B24BDBB3CC}" type="datetimeFigureOut">
               <a:rPr lang="en-US" smtClean="0"/>
-              <a:t>3/12/21</a:t>
+              <a:t>3/12/2021</a:t>
             </a:fld>
             <a:endParaRPr lang="en-US"/>
           </a:p>
@@ -13277,7 +13277,7 @@
           <a:p>
             <a:fld id="{B0FE2824-C2A0-4931-BB32-60B24BDBB3CC}" type="datetimeFigureOut">
               <a:rPr lang="en-US" smtClean="0"/>
-              <a:t>3/12/21</a:t>
+              <a:t>3/12/2021</a:t>
             </a:fld>
             <a:endParaRPr lang="en-US"/>
           </a:p>
@@ -13573,7 +13573,7 @@
           <a:p>
             <a:fld id="{B0FE2824-C2A0-4931-BB32-60B24BDBB3CC}" type="datetimeFigureOut">
               <a:rPr lang="en-US" smtClean="0"/>
-              <a:t>3/12/21</a:t>
+              <a:t>3/12/2021</a:t>
             </a:fld>
             <a:endParaRPr lang="en-US"/>
           </a:p>
@@ -13846,7 +13846,7 @@
           <a:p>
             <a:fld id="{B0FE2824-C2A0-4931-BB32-60B24BDBB3CC}" type="datetimeFigureOut">
               <a:rPr lang="en-US" smtClean="0"/>
-              <a:t>3/12/21</a:t>
+              <a:t>3/12/2021</a:t>
             </a:fld>
             <a:endParaRPr lang="en-US"/>
           </a:p>
@@ -14140,7 +14140,7 @@
             <a:fld id="{B0FE2824-C2A0-4931-BB32-60B24BDBB3CC}" type="datetimeFigureOut">
               <a:rPr lang="en-US" smtClean="0"/>
               <a:pPr/>
-              <a:t>3/12/21</a:t>
+              <a:t>3/12/2021</a:t>
             </a:fld>
             <a:endParaRPr lang="en-US"/>
           </a:p>

</xml_diff>